<commit_message>
Simplify RelayCommand to have no parameter for demo. Highlight discussed features in the powerpoint.
</commit_message>
<xml_diff>
--- a/WpfAndMvvm.pptx
+++ b/WpfAndMvvm.pptx
@@ -5,10 +5,10 @@
     <p:sldMasterId id="2147483752" r:id="rId1"/>
   </p:sldMasterIdLst>
   <p:notesMasterIdLst>
-    <p:notesMasterId r:id="rId7"/>
+    <p:notesMasterId r:id="rId8"/>
   </p:notesMasterIdLst>
   <p:handoutMasterIdLst>
-    <p:handoutMasterId r:id="rId8"/>
+    <p:handoutMasterId r:id="rId9"/>
   </p:handoutMasterIdLst>
   <p:sldIdLst>
     <p:sldId id="452" r:id="rId2"/>
@@ -16,6 +16,7 @@
     <p:sldId id="439" r:id="rId4"/>
     <p:sldId id="437" r:id="rId5"/>
     <p:sldId id="453" r:id="rId6"/>
+    <p:sldId id="454" r:id="rId7"/>
   </p:sldIdLst>
   <p:sldSz cx="9144000" cy="6858000" type="screen4x3"/>
   <p:notesSz cx="7077075" cy="9383713"/>
@@ -974,6 +975,93 @@
               <a:rPr lang="en-US" smtClean="0"/>
               <a:pPr/>
               <a:t>4</a:t>
+            </a:fld>
+            <a:endParaRPr lang="en-US"/>
+          </a:p>
+        </p:txBody>
+      </p:sp>
+    </p:spTree>
+  </p:cSld>
+  <p:clrMapOvr>
+    <a:masterClrMapping/>
+  </p:clrMapOvr>
+</p:notes>
+</file>
+
+<file path=ppt/notesSlides/notesSlide3.xml><?xml version="1.0" encoding="utf-8"?>
+<p:notes xmlns:a="http://schemas.openxmlformats.org/drawingml/2006/main" xmlns:r="http://schemas.openxmlformats.org/officeDocument/2006/relationships" xmlns:p="http://schemas.openxmlformats.org/presentationml/2006/main">
+  <p:cSld>
+    <p:spTree>
+      <p:nvGrpSpPr>
+        <p:cNvPr id="1" name=""/>
+        <p:cNvGrpSpPr/>
+        <p:nvPr/>
+      </p:nvGrpSpPr>
+      <p:grpSpPr>
+        <a:xfrm>
+          <a:off x="0" y="0"/>
+          <a:ext cx="0" cy="0"/>
+          <a:chOff x="0" y="0"/>
+          <a:chExt cx="0" cy="0"/>
+        </a:xfrm>
+      </p:grpSpPr>
+      <p:sp>
+        <p:nvSpPr>
+          <p:cNvPr id="2" name="Slide Image Placeholder 1"/>
+          <p:cNvSpPr>
+            <a:spLocks noGrp="1" noRot="1" noChangeAspect="1"/>
+          </p:cNvSpPr>
+          <p:nvPr>
+            <p:ph type="sldImg"/>
+          </p:nvPr>
+        </p:nvSpPr>
+        <p:spPr>
+          <a:xfrm>
+            <a:off x="1193800" y="704850"/>
+            <a:ext cx="4689475" cy="3517900"/>
+          </a:xfrm>
+        </p:spPr>
+      </p:sp>
+      <p:sp>
+        <p:nvSpPr>
+          <p:cNvPr id="3" name="Notes Placeholder 2"/>
+          <p:cNvSpPr>
+            <a:spLocks noGrp="1"/>
+          </p:cNvSpPr>
+          <p:nvPr>
+            <p:ph type="body" idx="1"/>
+          </p:nvPr>
+        </p:nvSpPr>
+        <p:spPr/>
+        <p:txBody>
+          <a:bodyPr>
+            <a:normAutofit/>
+          </a:bodyPr>
+          <a:lstStyle/>
+          <a:p>
+            <a:endParaRPr lang="en-US"/>
+          </a:p>
+        </p:txBody>
+      </p:sp>
+      <p:sp>
+        <p:nvSpPr>
+          <p:cNvPr id="4" name="Slide Number Placeholder 3"/>
+          <p:cNvSpPr>
+            <a:spLocks noGrp="1"/>
+          </p:cNvSpPr>
+          <p:nvPr>
+            <p:ph type="sldNum" sz="quarter" idx="10"/>
+          </p:nvPr>
+        </p:nvSpPr>
+        <p:spPr/>
+        <p:txBody>
+          <a:bodyPr/>
+          <a:lstStyle/>
+          <a:p>
+            <a:fld id="{CE6BF98D-4CD4-46D1-865A-2058C54ACE9B}" type="slidenum">
+              <a:rPr lang="en-US" smtClean="0"/>
+              <a:pPr/>
+              <a:t>6</a:t>
             </a:fld>
             <a:endParaRPr lang="en-US"/>
           </a:p>
@@ -6154,7 +6242,7 @@
         <p:spPr/>
         <p:txBody>
           <a:bodyPr>
-            <a:normAutofit lnSpcReduction="10000"/>
+            <a:normAutofit fontScale="85000" lnSpcReduction="20000"/>
           </a:bodyPr>
           <a:lstStyle/>
           <a:p>
@@ -6176,7 +6264,26 @@
             <a:pPr lvl="1"/>
             <a:r>
               <a:rPr lang="en-US" dirty="0" smtClean="0"/>
-              <a:t>XAML-driven interface is kept separate from model</a:t>
+              <a:t>XAML-driven interface is kept separate from </a:t>
+            </a:r>
+            <a:r>
+              <a:rPr lang="en-US" dirty="0" smtClean="0"/>
+              <a:t>model</a:t>
+            </a:r>
+          </a:p>
+          <a:p>
+            <a:pPr lvl="1"/>
+            <a:r>
+              <a:rPr lang="en-US" dirty="0" smtClean="0"/>
+              <a:t>A LOT of boilerplate in </a:t>
+            </a:r>
+            <a:r>
+              <a:rPr lang="en-US" dirty="0" err="1" smtClean="0"/>
+              <a:t>WinForms</a:t>
+            </a:r>
+            <a:r>
+              <a:rPr lang="en-US" dirty="0" smtClean="0"/>
+              <a:t>/Java SWT</a:t>
             </a:r>
             <a:endParaRPr lang="en-US" dirty="0" smtClean="0"/>
           </a:p>
@@ -6254,8 +6361,19 @@
             <a:pPr lvl="1"/>
             <a:r>
               <a:rPr lang="en-US" dirty="0" smtClean="0"/>
-              <a:t>Application-wide theming (like CSS)</a:t>
-            </a:r>
+              <a:t>Application-wide theming (like CSS</a:t>
+            </a:r>
+            <a:r>
+              <a:rPr lang="en-US" dirty="0" smtClean="0"/>
+              <a:t>)</a:t>
+            </a:r>
+          </a:p>
+          <a:p>
+            <a:r>
+              <a:rPr lang="en-US" dirty="0" smtClean="0"/>
+              <a:t>For Web… knockout.js has many similarities</a:t>
+            </a:r>
+            <a:endParaRPr lang="en-US" dirty="0" smtClean="0"/>
           </a:p>
         </p:txBody>
       </p:sp>
@@ -6337,6 +6455,192 @@
       <p:transition spd="slow"/>
     </mc:Fallback>
   </mc:AlternateContent>
+  <p:timing>
+    <p:tnLst>
+      <p:par>
+        <p:cTn id="1" dur="indefinite" restart="never" nodeType="tmRoot"/>
+      </p:par>
+    </p:tnLst>
+  </p:timing>
+</p:sld>
+</file>
+
+<file path=ppt/slides/slide6.xml><?xml version="1.0" encoding="utf-8"?>
+<p:sld xmlns:a="http://schemas.openxmlformats.org/drawingml/2006/main" xmlns:r="http://schemas.openxmlformats.org/officeDocument/2006/relationships" xmlns:p="http://schemas.openxmlformats.org/presentationml/2006/main">
+  <p:cSld>
+    <p:spTree>
+      <p:nvGrpSpPr>
+        <p:cNvPr id="1" name=""/>
+        <p:cNvGrpSpPr/>
+        <p:nvPr/>
+      </p:nvGrpSpPr>
+      <p:grpSpPr>
+        <a:xfrm>
+          <a:off x="0" y="0"/>
+          <a:ext cx="0" cy="0"/>
+          <a:chOff x="0" y="0"/>
+          <a:chExt cx="0" cy="0"/>
+        </a:xfrm>
+      </p:grpSpPr>
+      <p:sp>
+        <p:nvSpPr>
+          <p:cNvPr id="2" name="Title 1"/>
+          <p:cNvSpPr>
+            <a:spLocks noGrp="1"/>
+          </p:cNvSpPr>
+          <p:nvPr>
+            <p:ph type="title"/>
+          </p:nvPr>
+        </p:nvSpPr>
+        <p:spPr/>
+        <p:txBody>
+          <a:bodyPr>
+            <a:normAutofit/>
+          </a:bodyPr>
+          <a:lstStyle/>
+          <a:p>
+            <a:r>
+              <a:rPr lang="en-US" dirty="0" smtClean="0"/>
+              <a:t>WPF features</a:t>
+            </a:r>
+            <a:endParaRPr lang="en-US" dirty="0"/>
+          </a:p>
+        </p:txBody>
+      </p:sp>
+      <p:sp>
+        <p:nvSpPr>
+          <p:cNvPr id="3" name="Content Placeholder 2"/>
+          <p:cNvSpPr>
+            <a:spLocks noGrp="1"/>
+          </p:cNvSpPr>
+          <p:nvPr>
+            <p:ph idx="1"/>
+          </p:nvPr>
+        </p:nvSpPr>
+        <p:spPr/>
+        <p:txBody>
+          <a:bodyPr>
+            <a:normAutofit/>
+          </a:bodyPr>
+          <a:lstStyle/>
+          <a:p>
+            <a:pPr lvl="0"/>
+            <a:r>
+              <a:rPr lang="en-US" dirty="0" smtClean="0"/>
+              <a:t>XAML User Interface</a:t>
+            </a:r>
+            <a:endParaRPr lang="en-US" dirty="0"/>
+          </a:p>
+          <a:p>
+            <a:pPr lvl="1"/>
+            <a:r>
+              <a:rPr lang="en-US" dirty="0" smtClean="0"/>
+              <a:t>&lt;Resources&gt; … &lt;Style&gt;…</a:t>
+            </a:r>
+          </a:p>
+          <a:p>
+            <a:pPr lvl="1"/>
+            <a:r>
+              <a:rPr lang="en-US" dirty="0" smtClean="0"/>
+              <a:t>Layouts &lt;Grid&gt;,&lt;</a:t>
+            </a:r>
+            <a:r>
+              <a:rPr lang="en-US" dirty="0" err="1" smtClean="0"/>
+              <a:t>StackPanel</a:t>
+            </a:r>
+            <a:r>
+              <a:rPr lang="en-US" dirty="0" smtClean="0"/>
+              <a:t>&gt;</a:t>
+            </a:r>
+          </a:p>
+          <a:p>
+            <a:pPr lvl="1"/>
+            <a:r>
+              <a:rPr lang="en-US" dirty="0" smtClean="0"/>
+              <a:t>Binding Specification</a:t>
+            </a:r>
+            <a:endParaRPr lang="en-US" dirty="0" smtClean="0"/>
+          </a:p>
+          <a:p>
+            <a:pPr lvl="1"/>
+            <a:r>
+              <a:rPr lang="en-US" dirty="0" err="1" smtClean="0"/>
+              <a:t>DataTemplate</a:t>
+            </a:r>
+            <a:r>
+              <a:rPr lang="en-US" dirty="0" smtClean="0"/>
+              <a:t> for </a:t>
+            </a:r>
+            <a:r>
+              <a:rPr lang="en-US" dirty="0" err="1" smtClean="0"/>
+              <a:t>ListBox</a:t>
+            </a:r>
+            <a:endParaRPr lang="en-US" dirty="0" smtClean="0"/>
+          </a:p>
+          <a:p>
+            <a:r>
+              <a:rPr lang="en-US" dirty="0" err="1" smtClean="0"/>
+              <a:t>IValueConverter</a:t>
+            </a:r>
+            <a:r>
+              <a:rPr lang="en-US" dirty="0" smtClean="0"/>
+              <a:t> – influence XAML with code</a:t>
+            </a:r>
+          </a:p>
+          <a:p>
+            <a:r>
+              <a:rPr lang="en-US" dirty="0" err="1" smtClean="0"/>
+              <a:t>ViewModel</a:t>
+            </a:r>
+            <a:endParaRPr lang="en-US" dirty="0" smtClean="0"/>
+          </a:p>
+          <a:p>
+            <a:pPr lvl="1"/>
+            <a:r>
+              <a:rPr lang="en-US" dirty="0" smtClean="0"/>
+              <a:t>Notification of Property Changes for UI Binding</a:t>
+            </a:r>
+          </a:p>
+          <a:p>
+            <a:pPr lvl="1"/>
+            <a:r>
+              <a:rPr lang="en-US" dirty="0" smtClean="0"/>
+              <a:t>Command Binding (</a:t>
+            </a:r>
+            <a:r>
+              <a:rPr lang="en-US" dirty="0" err="1" smtClean="0"/>
+              <a:t>RelayCommand</a:t>
+            </a:r>
+            <a:r>
+              <a:rPr lang="en-US" dirty="0" smtClean="0"/>
+              <a:t> with lambda expressions)</a:t>
+            </a:r>
+          </a:p>
+          <a:p>
+            <a:pPr marL="0" indent="0">
+              <a:buNone/>
+            </a:pPr>
+            <a:endParaRPr lang="en-US" dirty="0"/>
+          </a:p>
+          <a:p>
+            <a:r>
+              <a:rPr lang="en-US" dirty="0" smtClean="0"/>
+              <a:t>I thought you said code…</a:t>
+            </a:r>
+            <a:endParaRPr lang="en-US" dirty="0" smtClean="0"/>
+          </a:p>
+        </p:txBody>
+      </p:sp>
+    </p:spTree>
+    <p:extLst>
+      <p:ext uri="{BB962C8B-B14F-4D97-AF65-F5344CB8AC3E}">
+        <p14:creationId xmlns:p14="http://schemas.microsoft.com/office/powerpoint/2010/main" val="981746479"/>
+      </p:ext>
+    </p:extLst>
+  </p:cSld>
+  <p:clrMapOvr>
+    <a:masterClrMapping/>
+  </p:clrMapOvr>
   <p:timing>
     <p:tnLst>
       <p:par>

</xml_diff>

<commit_message>
Just a little powerpoint clean up
</commit_message>
<xml_diff>
--- a/WpfAndMvvm.pptx
+++ b/WpfAndMvvm.pptx
@@ -6242,7 +6242,7 @@
         <p:spPr/>
         <p:txBody>
           <a:bodyPr>
-            <a:normAutofit fontScale="85000" lnSpcReduction="20000"/>
+            <a:normAutofit fontScale="92500" lnSpcReduction="20000"/>
           </a:bodyPr>
           <a:lstStyle/>
           <a:p>
@@ -6264,18 +6264,26 @@
             <a:pPr lvl="1"/>
             <a:r>
               <a:rPr lang="en-US" dirty="0" smtClean="0"/>
-              <a:t>XAML-driven interface is kept separate from </a:t>
-            </a:r>
-            <a:r>
-              <a:rPr lang="en-US" dirty="0" smtClean="0"/>
-              <a:t>model</a:t>
-            </a:r>
+              <a:t>XAML-driven interface is kept separate from model</a:t>
+            </a:r>
+          </a:p>
+          <a:p>
+            <a:pPr lvl="0"/>
+            <a:r>
+              <a:rPr lang="en-US" dirty="0" smtClean="0"/>
+              <a:t>Binding </a:t>
+            </a:r>
+            <a:endParaRPr lang="en-US" dirty="0" smtClean="0"/>
           </a:p>
           <a:p>
             <a:pPr lvl="1"/>
             <a:r>
               <a:rPr lang="en-US" dirty="0" smtClean="0"/>
-              <a:t>A LOT of boilerplate in </a:t>
+              <a:t>Eliminates a lot of boiler </a:t>
+            </a:r>
+            <a:r>
+              <a:rPr lang="en-US" dirty="0" smtClean="0"/>
+              <a:t>plate found in </a:t>
             </a:r>
             <a:r>
               <a:rPr lang="en-US" dirty="0" err="1" smtClean="0"/>
@@ -6283,30 +6291,21 @@
             </a:r>
             <a:r>
               <a:rPr lang="en-US" dirty="0" smtClean="0"/>
-              <a:t>/Java SWT</a:t>
+              <a:t>/Swing/SWT</a:t>
             </a:r>
             <a:endParaRPr lang="en-US" dirty="0" smtClean="0"/>
           </a:p>
           <a:p>
-            <a:pPr lvl="0"/>
-            <a:r>
-              <a:rPr lang="en-US" dirty="0" smtClean="0"/>
-              <a:t>Binding </a:t>
-            </a:r>
-          </a:p>
-          <a:p>
             <a:pPr lvl="1"/>
             <a:r>
               <a:rPr lang="en-US" dirty="0" smtClean="0"/>
-              <a:t>Eliminates a lot of boiler plate</a:t>
-            </a:r>
-          </a:p>
-          <a:p>
-            <a:pPr lvl="1"/>
-            <a:r>
-              <a:rPr lang="en-US" dirty="0" smtClean="0"/>
-              <a:t>Gives rise to MVVM pattern</a:t>
-            </a:r>
+              <a:t>Fits nicely with </a:t>
+            </a:r>
+            <a:r>
+              <a:rPr lang="en-US" smtClean="0"/>
+              <a:t>MVVM design pattern</a:t>
+            </a:r>
+            <a:endParaRPr lang="en-US" dirty="0" smtClean="0"/>
           </a:p>
           <a:p>
             <a:r>
@@ -6361,11 +6360,7 @@
             <a:pPr lvl="1"/>
             <a:r>
               <a:rPr lang="en-US" dirty="0" smtClean="0"/>
-              <a:t>Application-wide theming (like CSS</a:t>
-            </a:r>
-            <a:r>
-              <a:rPr lang="en-US" dirty="0" smtClean="0"/>
-              <a:t>)</a:t>
+              <a:t>Application-wide theming (like CSS)</a:t>
             </a:r>
           </a:p>
           <a:p>
@@ -6373,7 +6368,6 @@
               <a:rPr lang="en-US" dirty="0" smtClean="0"/>
               <a:t>For Web… knockout.js has many similarities</a:t>
             </a:r>
-            <a:endParaRPr lang="en-US" dirty="0" smtClean="0"/>
           </a:p>
         </p:txBody>
       </p:sp>
@@ -6559,7 +6553,6 @@
               <a:rPr lang="en-US" dirty="0" smtClean="0"/>
               <a:t>Binding Specification</a:t>
             </a:r>
-            <a:endParaRPr lang="en-US" dirty="0" smtClean="0"/>
           </a:p>
           <a:p>
             <a:pPr lvl="1"/>
@@ -6627,7 +6620,6 @@
               <a:rPr lang="en-US" dirty="0" smtClean="0"/>
               <a:t>I thought you said code…</a:t>
             </a:r>
-            <a:endParaRPr lang="en-US" dirty="0" smtClean="0"/>
           </a:p>
         </p:txBody>
       </p:sp>

</xml_diff>